<commit_message>
Update Week 5 QCJSON and JSON.pptx
</commit_message>
<xml_diff>
--- a/Week 5 QCJSON and JSON.pptx
+++ b/Week 5 QCJSON and JSON.pptx
@@ -126,283 +126,6 @@
     <p1510:client id="{0E763FAC-B52B-4F51-B399-6384C500C227}" v="20" dt="2019-05-30T03:26:51.555"/>
   </p1510:revLst>
 </p1510:revInfo>
-</file>
-
-<file path=ppt/changesInfos/changesInfo1.xml><?xml version="1.0" encoding="utf-8"?>
-<pc:chgInfo xmlns:a="http://schemas.openxmlformats.org/drawingml/2006/main" xmlns:r="http://schemas.openxmlformats.org/officeDocument/2006/relationships" xmlns:ac="http://schemas.microsoft.com/office/drawing/2013/main/command" xmlns:pc="http://schemas.microsoft.com/office/powerpoint/2013/main/command">
-  <pc:docChgLst>
-    <pc:chgData name="Edgar Romero" userId="4277ae02-cb03-4964-a174-af1da477243e" providerId="ADAL" clId="{0E763FAC-B52B-4F51-B399-6384C500C227}"/>
-    <pc:docChg chg="undo custSel addSld modSld">
-      <pc:chgData name="Edgar Romero" userId="4277ae02-cb03-4964-a174-af1da477243e" providerId="ADAL" clId="{0E763FAC-B52B-4F51-B399-6384C500C227}" dt="2019-05-30T03:26:57.564" v="450" actId="12"/>
-      <pc:docMkLst>
-        <pc:docMk/>
-      </pc:docMkLst>
-      <pc:sldChg chg="modSp">
-        <pc:chgData name="Edgar Romero" userId="4277ae02-cb03-4964-a174-af1da477243e" providerId="ADAL" clId="{0E763FAC-B52B-4F51-B399-6384C500C227}" dt="2019-05-30T02:12:51.912" v="0"/>
-        <pc:sldMkLst>
-          <pc:docMk/>
-          <pc:sldMk cId="3111980305" sldId="256"/>
-        </pc:sldMkLst>
-        <pc:spChg chg="mod">
-          <ac:chgData name="Edgar Romero" userId="4277ae02-cb03-4964-a174-af1da477243e" providerId="ADAL" clId="{0E763FAC-B52B-4F51-B399-6384C500C227}" dt="2019-05-30T02:12:51.912" v="0"/>
-          <ac:spMkLst>
-            <pc:docMk/>
-            <pc:sldMk cId="3111980305" sldId="256"/>
-            <ac:spMk id="2" creationId="{2A012C37-D437-4410-A64C-8E3E3E713038}"/>
-          </ac:spMkLst>
-        </pc:spChg>
-      </pc:sldChg>
-      <pc:sldChg chg="modSp">
-        <pc:chgData name="Edgar Romero" userId="4277ae02-cb03-4964-a174-af1da477243e" providerId="ADAL" clId="{0E763FAC-B52B-4F51-B399-6384C500C227}" dt="2019-05-30T02:51:38.173" v="219" actId="14100"/>
-        <pc:sldMkLst>
-          <pc:docMk/>
-          <pc:sldMk cId="2579642615" sldId="257"/>
-        </pc:sldMkLst>
-        <pc:spChg chg="mod">
-          <ac:chgData name="Edgar Romero" userId="4277ae02-cb03-4964-a174-af1da477243e" providerId="ADAL" clId="{0E763FAC-B52B-4F51-B399-6384C500C227}" dt="2019-05-30T02:51:34.622" v="218" actId="1076"/>
-          <ac:spMkLst>
-            <pc:docMk/>
-            <pc:sldMk cId="2579642615" sldId="257"/>
-            <ac:spMk id="2" creationId="{1A2EF139-2E18-4C4B-A6CF-064C221DF531}"/>
-          </ac:spMkLst>
-        </pc:spChg>
-        <pc:spChg chg="mod">
-          <ac:chgData name="Edgar Romero" userId="4277ae02-cb03-4964-a174-af1da477243e" providerId="ADAL" clId="{0E763FAC-B52B-4F51-B399-6384C500C227}" dt="2019-05-30T02:51:38.173" v="219" actId="14100"/>
-          <ac:spMkLst>
-            <pc:docMk/>
-            <pc:sldMk cId="2579642615" sldId="257"/>
-            <ac:spMk id="3" creationId="{1DE16EAF-DBD4-444D-A219-98DD60D4395A}"/>
-          </ac:spMkLst>
-        </pc:spChg>
-      </pc:sldChg>
-      <pc:sldChg chg="modSp">
-        <pc:chgData name="Edgar Romero" userId="4277ae02-cb03-4964-a174-af1da477243e" providerId="ADAL" clId="{0E763FAC-B52B-4F51-B399-6384C500C227}" dt="2019-05-30T03:18:37.100" v="447"/>
-        <pc:sldMkLst>
-          <pc:docMk/>
-          <pc:sldMk cId="1717791329" sldId="259"/>
-        </pc:sldMkLst>
-        <pc:spChg chg="mod">
-          <ac:chgData name="Edgar Romero" userId="4277ae02-cb03-4964-a174-af1da477243e" providerId="ADAL" clId="{0E763FAC-B52B-4F51-B399-6384C500C227}" dt="2019-05-30T02:17:08.333" v="34" actId="6549"/>
-          <ac:spMkLst>
-            <pc:docMk/>
-            <pc:sldMk cId="1717791329" sldId="259"/>
-            <ac:spMk id="3" creationId="{7175D43A-7F31-4865-B9BD-36686750FBD4}"/>
-          </ac:spMkLst>
-        </pc:spChg>
-        <pc:spChg chg="mod">
-          <ac:chgData name="Edgar Romero" userId="4277ae02-cb03-4964-a174-af1da477243e" providerId="ADAL" clId="{0E763FAC-B52B-4F51-B399-6384C500C227}" dt="2019-05-30T03:18:37.100" v="447"/>
-          <ac:spMkLst>
-            <pc:docMk/>
-            <pc:sldMk cId="1717791329" sldId="259"/>
-            <ac:spMk id="4" creationId="{8493D92C-E74E-41FC-82E7-C85811ED85A3}"/>
-          </ac:spMkLst>
-        </pc:spChg>
-      </pc:sldChg>
-      <pc:sldChg chg="addSp delSp modSp">
-        <pc:chgData name="Edgar Romero" userId="4277ae02-cb03-4964-a174-af1da477243e" providerId="ADAL" clId="{0E763FAC-B52B-4F51-B399-6384C500C227}" dt="2019-05-30T02:20:23.716" v="41" actId="1076"/>
-        <pc:sldMkLst>
-          <pc:docMk/>
-          <pc:sldMk cId="1282804578" sldId="264"/>
-        </pc:sldMkLst>
-        <pc:spChg chg="mod">
-          <ac:chgData name="Edgar Romero" userId="4277ae02-cb03-4964-a174-af1da477243e" providerId="ADAL" clId="{0E763FAC-B52B-4F51-B399-6384C500C227}" dt="2019-05-30T02:13:32.667" v="6" actId="27636"/>
-          <ac:spMkLst>
-            <pc:docMk/>
-            <pc:sldMk cId="1282804578" sldId="264"/>
-            <ac:spMk id="2" creationId="{1A2EF139-2E18-4C4B-A6CF-064C221DF531}"/>
-          </ac:spMkLst>
-        </pc:spChg>
-        <pc:picChg chg="add mod">
-          <ac:chgData name="Edgar Romero" userId="4277ae02-cb03-4964-a174-af1da477243e" providerId="ADAL" clId="{0E763FAC-B52B-4F51-B399-6384C500C227}" dt="2019-05-30T02:20:23.716" v="41" actId="1076"/>
-          <ac:picMkLst>
-            <pc:docMk/>
-            <pc:sldMk cId="1282804578" sldId="264"/>
-            <ac:picMk id="4" creationId="{3046C3AA-88A5-44D7-8263-B94460E1C23E}"/>
-          </ac:picMkLst>
-        </pc:picChg>
-        <pc:picChg chg="del">
-          <ac:chgData name="Edgar Romero" userId="4277ae02-cb03-4964-a174-af1da477243e" providerId="ADAL" clId="{0E763FAC-B52B-4F51-B399-6384C500C227}" dt="2019-05-30T02:20:05.785" v="38" actId="478"/>
-          <ac:picMkLst>
-            <pc:docMk/>
-            <pc:sldMk cId="1282804578" sldId="264"/>
-            <ac:picMk id="5" creationId="{D9595877-6113-406D-ADD1-2EA06DB5E34E}"/>
-          </ac:picMkLst>
-        </pc:picChg>
-      </pc:sldChg>
-      <pc:sldChg chg="addSp modSp">
-        <pc:chgData name="Edgar Romero" userId="4277ae02-cb03-4964-a174-af1da477243e" providerId="ADAL" clId="{0E763FAC-B52B-4F51-B399-6384C500C227}" dt="2019-05-30T03:26:57.564" v="450" actId="12"/>
-        <pc:sldMkLst>
-          <pc:docMk/>
-          <pc:sldMk cId="2012650233" sldId="265"/>
-        </pc:sldMkLst>
-        <pc:spChg chg="mod">
-          <ac:chgData name="Edgar Romero" userId="4277ae02-cb03-4964-a174-af1da477243e" providerId="ADAL" clId="{0E763FAC-B52B-4F51-B399-6384C500C227}" dt="2019-05-30T03:00:17.342" v="264" actId="20577"/>
-          <ac:spMkLst>
-            <pc:docMk/>
-            <pc:sldMk cId="2012650233" sldId="265"/>
-            <ac:spMk id="2" creationId="{9ADBA913-4C17-4491-8DFD-D96BA4BF11D1}"/>
-          </ac:spMkLst>
-        </pc:spChg>
-        <pc:spChg chg="add mod">
-          <ac:chgData name="Edgar Romero" userId="4277ae02-cb03-4964-a174-af1da477243e" providerId="ADAL" clId="{0E763FAC-B52B-4F51-B399-6384C500C227}" dt="2019-05-30T03:13:18.831" v="444" actId="1076"/>
-          <ac:spMkLst>
-            <pc:docMk/>
-            <pc:sldMk cId="2012650233" sldId="265"/>
-            <ac:spMk id="3" creationId="{35BED5E3-6201-4175-8840-73651D99E4A2}"/>
-          </ac:spMkLst>
-        </pc:spChg>
-        <pc:spChg chg="mod">
-          <ac:chgData name="Edgar Romero" userId="4277ae02-cb03-4964-a174-af1da477243e" providerId="ADAL" clId="{0E763FAC-B52B-4F51-B399-6384C500C227}" dt="2019-05-30T03:00:11.983" v="257" actId="20577"/>
-          <ac:spMkLst>
-            <pc:docMk/>
-            <pc:sldMk cId="2012650233" sldId="265"/>
-            <ac:spMk id="4" creationId="{668ECA43-6D0E-4470-A94A-545427F8CED8}"/>
-          </ac:spMkLst>
-        </pc:spChg>
-        <pc:spChg chg="mod">
-          <ac:chgData name="Edgar Romero" userId="4277ae02-cb03-4964-a174-af1da477243e" providerId="ADAL" clId="{0E763FAC-B52B-4F51-B399-6384C500C227}" dt="2019-05-30T03:26:57.564" v="450" actId="12"/>
-          <ac:spMkLst>
-            <pc:docMk/>
-            <pc:sldMk cId="2012650233" sldId="265"/>
-            <ac:spMk id="6" creationId="{E64C071F-17DD-417C-9B7A-37929EF58A9A}"/>
-          </ac:spMkLst>
-        </pc:spChg>
-      </pc:sldChg>
-      <pc:sldChg chg="modSp">
-        <pc:chgData name="Edgar Romero" userId="4277ae02-cb03-4964-a174-af1da477243e" providerId="ADAL" clId="{0E763FAC-B52B-4F51-B399-6384C500C227}" dt="2019-05-30T02:23:52.890" v="59" actId="20577"/>
-        <pc:sldMkLst>
-          <pc:docMk/>
-          <pc:sldMk cId="3114048660" sldId="266"/>
-        </pc:sldMkLst>
-        <pc:spChg chg="mod">
-          <ac:chgData name="Edgar Romero" userId="4277ae02-cb03-4964-a174-af1da477243e" providerId="ADAL" clId="{0E763FAC-B52B-4F51-B399-6384C500C227}" dt="2019-05-30T02:22:44.875" v="43" actId="14100"/>
-          <ac:spMkLst>
-            <pc:docMk/>
-            <pc:sldMk cId="3114048660" sldId="266"/>
-            <ac:spMk id="2" creationId="{1A2EF139-2E18-4C4B-A6CF-064C221DF531}"/>
-          </ac:spMkLst>
-        </pc:spChg>
-        <pc:spChg chg="mod">
-          <ac:chgData name="Edgar Romero" userId="4277ae02-cb03-4964-a174-af1da477243e" providerId="ADAL" clId="{0E763FAC-B52B-4F51-B399-6384C500C227}" dt="2019-05-30T02:23:52.890" v="59" actId="20577"/>
-          <ac:spMkLst>
-            <pc:docMk/>
-            <pc:sldMk cId="3114048660" sldId="266"/>
-            <ac:spMk id="3" creationId="{1DE16EAF-DBD4-444D-A219-98DD60D4395A}"/>
-          </ac:spMkLst>
-        </pc:spChg>
-      </pc:sldChg>
-      <pc:sldChg chg="addSp delSp modSp">
-        <pc:chgData name="Edgar Romero" userId="4277ae02-cb03-4964-a174-af1da477243e" providerId="ADAL" clId="{0E763FAC-B52B-4F51-B399-6384C500C227}" dt="2019-05-30T03:11:55.121" v="441" actId="14100"/>
-        <pc:sldMkLst>
-          <pc:docMk/>
-          <pc:sldMk cId="709569395" sldId="267"/>
-        </pc:sldMkLst>
-        <pc:spChg chg="mod">
-          <ac:chgData name="Edgar Romero" userId="4277ae02-cb03-4964-a174-af1da477243e" providerId="ADAL" clId="{0E763FAC-B52B-4F51-B399-6384C500C227}" dt="2019-05-30T03:11:45.216" v="440" actId="20577"/>
-          <ac:spMkLst>
-            <pc:docMk/>
-            <pc:sldMk cId="709569395" sldId="267"/>
-            <ac:spMk id="2" creationId="{1A2EF139-2E18-4C4B-A6CF-064C221DF531}"/>
-          </ac:spMkLst>
-        </pc:spChg>
-        <pc:spChg chg="add del mod">
-          <ac:chgData name="Edgar Romero" userId="4277ae02-cb03-4964-a174-af1da477243e" providerId="ADAL" clId="{0E763FAC-B52B-4F51-B399-6384C500C227}" dt="2019-05-30T02:38:55.103" v="156"/>
-          <ac:spMkLst>
-            <pc:docMk/>
-            <pc:sldMk cId="709569395" sldId="267"/>
-            <ac:spMk id="5" creationId="{9466C24E-E7B7-4519-8BA4-CEB52234859A}"/>
-          </ac:spMkLst>
-        </pc:spChg>
-        <pc:spChg chg="add mod">
-          <ac:chgData name="Edgar Romero" userId="4277ae02-cb03-4964-a174-af1da477243e" providerId="ADAL" clId="{0E763FAC-B52B-4F51-B399-6384C500C227}" dt="2019-05-30T03:11:55.121" v="441" actId="14100"/>
-          <ac:spMkLst>
-            <pc:docMk/>
-            <pc:sldMk cId="709569395" sldId="267"/>
-            <ac:spMk id="7" creationId="{E6E54B2F-8302-4BBC-B2AF-287C9A8148E4}"/>
-          </ac:spMkLst>
-        </pc:spChg>
-        <pc:spChg chg="add mod">
-          <ac:chgData name="Edgar Romero" userId="4277ae02-cb03-4964-a174-af1da477243e" providerId="ADAL" clId="{0E763FAC-B52B-4F51-B399-6384C500C227}" dt="2019-05-30T03:09:15.729" v="420" actId="20577"/>
-          <ac:spMkLst>
-            <pc:docMk/>
-            <pc:sldMk cId="709569395" sldId="267"/>
-            <ac:spMk id="8" creationId="{F80DB5AC-F372-49B0-87F5-ABD3EE99E2AA}"/>
-          </ac:spMkLst>
-        </pc:spChg>
-        <pc:picChg chg="del">
-          <ac:chgData name="Edgar Romero" userId="4277ae02-cb03-4964-a174-af1da477243e" providerId="ADAL" clId="{0E763FAC-B52B-4F51-B399-6384C500C227}" dt="2019-05-30T02:35:26.297" v="141" actId="478"/>
-          <ac:picMkLst>
-            <pc:docMk/>
-            <pc:sldMk cId="709569395" sldId="267"/>
-            <ac:picMk id="4" creationId="{9F68A2C6-4891-4502-9D55-A9503358AD75}"/>
-          </ac:picMkLst>
-        </pc:picChg>
-      </pc:sldChg>
-      <pc:sldChg chg="addSp delSp modSp">
-        <pc:chgData name="Edgar Romero" userId="4277ae02-cb03-4964-a174-af1da477243e" providerId="ADAL" clId="{0E763FAC-B52B-4F51-B399-6384C500C227}" dt="2019-05-30T02:45:00.472" v="185" actId="1076"/>
-        <pc:sldMkLst>
-          <pc:docMk/>
-          <pc:sldMk cId="3803818406" sldId="268"/>
-        </pc:sldMkLst>
-        <pc:spChg chg="mod">
-          <ac:chgData name="Edgar Romero" userId="4277ae02-cb03-4964-a174-af1da477243e" providerId="ADAL" clId="{0E763FAC-B52B-4F51-B399-6384C500C227}" dt="2019-05-30T02:44:50.439" v="183" actId="1076"/>
-          <ac:spMkLst>
-            <pc:docMk/>
-            <pc:sldMk cId="3803818406" sldId="268"/>
-            <ac:spMk id="2" creationId="{1A2EF139-2E18-4C4B-A6CF-064C221DF531}"/>
-          </ac:spMkLst>
-        </pc:spChg>
-        <pc:spChg chg="mod">
-          <ac:chgData name="Edgar Romero" userId="4277ae02-cb03-4964-a174-af1da477243e" providerId="ADAL" clId="{0E763FAC-B52B-4F51-B399-6384C500C227}" dt="2019-05-30T02:44:55.253" v="184" actId="1076"/>
-          <ac:spMkLst>
-            <pc:docMk/>
-            <pc:sldMk cId="3803818406" sldId="268"/>
-            <ac:spMk id="3" creationId="{1DE16EAF-DBD4-444D-A219-98DD60D4395A}"/>
-          </ac:spMkLst>
-        </pc:spChg>
-        <pc:spChg chg="add mod">
-          <ac:chgData name="Edgar Romero" userId="4277ae02-cb03-4964-a174-af1da477243e" providerId="ADAL" clId="{0E763FAC-B52B-4F51-B399-6384C500C227}" dt="2019-05-30T02:45:00.472" v="185" actId="1076"/>
-          <ac:spMkLst>
-            <pc:docMk/>
-            <pc:sldMk cId="3803818406" sldId="268"/>
-            <ac:spMk id="4" creationId="{AA39D1E6-4649-4420-9AF8-7E7F2B8A56F9}"/>
-          </ac:spMkLst>
-        </pc:spChg>
-        <pc:spChg chg="add mod">
-          <ac:chgData name="Edgar Romero" userId="4277ae02-cb03-4964-a174-af1da477243e" providerId="ADAL" clId="{0E763FAC-B52B-4F51-B399-6384C500C227}" dt="2019-05-30T02:42:50.160" v="182" actId="122"/>
-          <ac:spMkLst>
-            <pc:docMk/>
-            <pc:sldMk cId="3803818406" sldId="268"/>
-            <ac:spMk id="6" creationId="{03D25092-81C9-467A-998B-D916C13AE692}"/>
-          </ac:spMkLst>
-        </pc:spChg>
-        <pc:picChg chg="add del mod">
-          <ac:chgData name="Edgar Romero" userId="4277ae02-cb03-4964-a174-af1da477243e" providerId="ADAL" clId="{0E763FAC-B52B-4F51-B399-6384C500C227}" dt="2019-05-30T02:39:31.181" v="163" actId="478"/>
-          <ac:picMkLst>
-            <pc:docMk/>
-            <pc:sldMk cId="3803818406" sldId="268"/>
-            <ac:picMk id="5" creationId="{8F8D15A2-BCB8-4F24-AB6C-DDEBDEEE5BDD}"/>
-          </ac:picMkLst>
-        </pc:picChg>
-      </pc:sldChg>
-      <pc:sldChg chg="modSp add">
-        <pc:chgData name="Edgar Romero" userId="4277ae02-cb03-4964-a174-af1da477243e" providerId="ADAL" clId="{0E763FAC-B52B-4F51-B399-6384C500C227}" dt="2019-05-30T02:55:56.799" v="247" actId="20577"/>
-        <pc:sldMkLst>
-          <pc:docMk/>
-          <pc:sldMk cId="2496380629" sldId="269"/>
-        </pc:sldMkLst>
-        <pc:spChg chg="mod">
-          <ac:chgData name="Edgar Romero" userId="4277ae02-cb03-4964-a174-af1da477243e" providerId="ADAL" clId="{0E763FAC-B52B-4F51-B399-6384C500C227}" dt="2019-05-30T02:55:56.799" v="247" actId="20577"/>
-          <ac:spMkLst>
-            <pc:docMk/>
-            <pc:sldMk cId="2496380629" sldId="269"/>
-            <ac:spMk id="3" creationId="{1DE16EAF-DBD4-444D-A219-98DD60D4395A}"/>
-          </ac:spMkLst>
-        </pc:spChg>
-      </pc:sldChg>
-    </pc:docChg>
-  </pc:docChgLst>
-</pc:chgInfo>
 </file>
 
 <file path=ppt/slideLayouts/slideLayout1.xml><?xml version="1.0" encoding="utf-8"?>
@@ -8329,7 +8052,7 @@
         <p:spPr>
           <a:xfrm>
             <a:off x="6443932" y="1891743"/>
-            <a:ext cx="5391509" cy="4637314"/>
+            <a:ext cx="5391509" cy="3223721"/>
           </a:xfrm>
           <a:prstGeom prst="rect">
             <a:avLst/>
@@ -8337,7 +8060,7 @@
         </p:spPr>
         <p:txBody>
           <a:bodyPr vert="horz" lIns="91440" tIns="45720" rIns="91440" bIns="45720" rtlCol="0">
-            <a:normAutofit/>
+            <a:normAutofit fontScale="25000" lnSpcReduction="20000"/>
           </a:bodyPr>
           <a:lstStyle>
             <a:lvl1pPr marL="228600" indent="-228600" algn="l" defTabSz="914400" rtl="0" eaLnBrk="1" latinLnBrk="0" hangingPunct="1">
@@ -8505,34 +8228,43 @@
           </a:lstStyle>
           <a:p>
             <a:pPr marL="0" indent="0" fontAlgn="base">
+              <a:lnSpc>
+                <a:spcPct val="150000"/>
+              </a:lnSpc>
               <a:buNone/>
             </a:pPr>
             <a:r>
-              <a:rPr lang="en-US" b="1" dirty="0">
-                <a:latin typeface="Roboto"/>
+              <a:rPr lang="en-US" sz="9600" dirty="0">
+                <a:latin typeface="Helvetica Neue"/>
               </a:rPr>
-              <a:t>Note : </a:t>
-            </a:r>
-            <a:r>
-              <a:rPr lang="en-US" dirty="0">
-                <a:latin typeface="Roboto"/>
+              <a:t>To remember: </a:t>
+            </a:r>
+          </a:p>
+          <a:p>
+            <a:pPr marL="0" indent="0" fontAlgn="base">
+              <a:lnSpc>
+                <a:spcPct val="150000"/>
+              </a:lnSpc>
+              <a:buNone/>
+            </a:pPr>
+            <a:r>
+              <a:rPr lang="en-US" sz="9600" dirty="0">
+                <a:latin typeface="Helvetica Neue"/>
               </a:rPr>
               <a:t>In JSON, An object is an unordered set of name/value pairs, so </a:t>
             </a:r>
             <a:r>
-              <a:rPr lang="en-US" dirty="0" err="1">
-                <a:latin typeface="Roboto"/>
+              <a:rPr lang="en-US" sz="9600" dirty="0" err="1">
+                <a:latin typeface="Helvetica Neue"/>
               </a:rPr>
               <a:t>JSONObject</a:t>
             </a:r>
             <a:r>
-              <a:rPr lang="en-US" dirty="0">
-                <a:latin typeface="Roboto"/>
+              <a:rPr lang="en-US" sz="9600" dirty="0">
+                <a:latin typeface="Helvetica Neue"/>
               </a:rPr>
               <a:t> doesn’t preserve the order of an object’s name/value pairs, since it is (by definition) not significant. Hence in our output file, order is not preserved.</a:t>
             </a:r>
-          </a:p>
-          <a:p>
             <a:br>
               <a:rPr lang="en-US" dirty="0"/>
             </a:br>
@@ -8555,7 +8287,7 @@
         <p:spPr>
           <a:xfrm>
             <a:off x="356559" y="1891743"/>
-            <a:ext cx="5738004" cy="2308324"/>
+            <a:ext cx="5738004" cy="3347519"/>
           </a:xfrm>
           <a:prstGeom prst="rect">
             <a:avLst/>
@@ -8568,6 +8300,9 @@
           <a:lstStyle/>
           <a:p>
             <a:pPr marL="285750" indent="-285750">
+              <a:lnSpc>
+                <a:spcPct val="150000"/>
+              </a:lnSpc>
               <a:buFont typeface="Arial" panose="020B0604020202020204" pitchFamily="34" charset="0"/>
               <a:buChar char="•"/>
             </a:pPr>
@@ -8580,6 +8315,9 @@
           </a:p>
           <a:p>
             <a:pPr marL="285750" indent="-285750">
+              <a:lnSpc>
+                <a:spcPct val="150000"/>
+              </a:lnSpc>
               <a:buFont typeface="Arial" panose="020B0604020202020204" pitchFamily="34" charset="0"/>
               <a:buChar char="•"/>
             </a:pPr>
@@ -8592,6 +8330,9 @@
           </a:p>
           <a:p>
             <a:pPr marL="285750" indent="-285750">
+              <a:lnSpc>
+                <a:spcPct val="150000"/>
+              </a:lnSpc>
               <a:buFont typeface="Arial" panose="020B0604020202020204" pitchFamily="34" charset="0"/>
               <a:buChar char="•"/>
             </a:pPr>

</xml_diff>